<commit_message>
minor changes in codes
</commit_message>
<xml_diff>
--- a/javaSlides/Java Slides part 1.pptx
+++ b/javaSlides/Java Slides part 1.pptx
@@ -285,7 +285,7 @@
           <a:p>
             <a:fld id="{AF869721-F543-4A6C-BF9D-65D7CC540427}" type="datetimeFigureOut">
               <a:rPr lang="en-US" smtClean="0"/>
-              <a:t>5/27/2023</a:t>
+              <a:t>6/8/2023</a:t>
             </a:fld>
             <a:endParaRPr lang="en-US" dirty="0"/>
           </a:p>
@@ -462,7 +462,7 @@
           <a:p>
             <a:fld id="{C732326A-4C88-4AFB-AA5B-5919D81DFF5B}" type="datetimeFigureOut">
               <a:rPr lang="en-US" smtClean="0"/>
-              <a:t>5/27/2023</a:t>
+              <a:t>6/8/2023</a:t>
             </a:fld>
             <a:endParaRPr lang="en-US" dirty="0"/>
           </a:p>
@@ -1143,7 +1143,7 @@
             <a:fld id="{B61BEF0D-F0BB-DE4B-95CE-6DB70DBA9567}" type="datetimeFigureOut">
               <a:rPr lang="en-US" smtClean="0"/>
               <a:pPr/>
-              <a:t>5/27/2023</a:t>
+              <a:t>6/8/2023</a:t>
             </a:fld>
             <a:endParaRPr lang="en-US" dirty="0"/>
           </a:p>
@@ -1407,7 +1407,7 @@
             <a:fld id="{B61BEF0D-F0BB-DE4B-95CE-6DB70DBA9567}" type="datetimeFigureOut">
               <a:rPr lang="en-US" smtClean="0"/>
               <a:pPr/>
-              <a:t>5/27/2023</a:t>
+              <a:t>6/8/2023</a:t>
             </a:fld>
             <a:endParaRPr lang="en-US" dirty="0"/>
           </a:p>
@@ -1644,7 +1644,7 @@
             <a:fld id="{B61BEF0D-F0BB-DE4B-95CE-6DB70DBA9567}" type="datetimeFigureOut">
               <a:rPr lang="en-US" smtClean="0"/>
               <a:pPr/>
-              <a:t>5/27/2023</a:t>
+              <a:t>6/8/2023</a:t>
             </a:fld>
             <a:endParaRPr lang="en-US" dirty="0"/>
           </a:p>
@@ -1886,7 +1886,7 @@
             <a:fld id="{B61BEF0D-F0BB-DE4B-95CE-6DB70DBA9567}" type="datetimeFigureOut">
               <a:rPr lang="en-US" smtClean="0"/>
               <a:pPr/>
-              <a:t>5/27/2023</a:t>
+              <a:t>6/8/2023</a:t>
             </a:fld>
             <a:endParaRPr lang="en-US" dirty="0"/>
           </a:p>
@@ -2195,7 +2195,7 @@
             <a:fld id="{B61BEF0D-F0BB-DE4B-95CE-6DB70DBA9567}" type="datetimeFigureOut">
               <a:rPr lang="en-US" smtClean="0"/>
               <a:pPr/>
-              <a:t>5/27/2023</a:t>
+              <a:t>6/8/2023</a:t>
             </a:fld>
             <a:endParaRPr lang="en-US" dirty="0"/>
           </a:p>
@@ -2499,7 +2499,7 @@
             <a:fld id="{B61BEF0D-F0BB-DE4B-95CE-6DB70DBA9567}" type="datetimeFigureOut">
               <a:rPr lang="en-US" smtClean="0"/>
               <a:pPr/>
-              <a:t>5/27/2023</a:t>
+              <a:t>6/8/2023</a:t>
             </a:fld>
             <a:endParaRPr lang="en-US" dirty="0"/>
           </a:p>
@@ -2923,7 +2923,7 @@
             <a:fld id="{B61BEF0D-F0BB-DE4B-95CE-6DB70DBA9567}" type="datetimeFigureOut">
               <a:rPr lang="en-US" smtClean="0"/>
               <a:pPr/>
-              <a:t>5/27/2023</a:t>
+              <a:t>6/8/2023</a:t>
             </a:fld>
             <a:endParaRPr lang="en-US" dirty="0"/>
           </a:p>
@@ -3020,7 +3020,7 @@
             <a:fld id="{B61BEF0D-F0BB-DE4B-95CE-6DB70DBA9567}" type="datetimeFigureOut">
               <a:rPr lang="en-US" smtClean="0"/>
               <a:pPr/>
-              <a:t>5/27/2023</a:t>
+              <a:t>6/8/2023</a:t>
             </a:fld>
             <a:endParaRPr lang="en-US" dirty="0"/>
           </a:p>
@@ -3184,7 +3184,7 @@
             <a:fld id="{B61BEF0D-F0BB-DE4B-95CE-6DB70DBA9567}" type="datetimeFigureOut">
               <a:rPr lang="en-US" smtClean="0"/>
               <a:pPr/>
-              <a:t>5/27/2023</a:t>
+              <a:t>6/8/2023</a:t>
             </a:fld>
             <a:endParaRPr lang="en-US" dirty="0"/>
           </a:p>
@@ -3564,7 +3564,7 @@
             <a:fld id="{B61BEF0D-F0BB-DE4B-95CE-6DB70DBA9567}" type="datetimeFigureOut">
               <a:rPr lang="en-US" smtClean="0"/>
               <a:pPr/>
-              <a:t>5/27/2023</a:t>
+              <a:t>6/8/2023</a:t>
             </a:fld>
             <a:endParaRPr lang="en-US" dirty="0"/>
           </a:p>
@@ -3854,7 +3854,7 @@
             <a:fld id="{B61BEF0D-F0BB-DE4B-95CE-6DB70DBA9567}" type="datetimeFigureOut">
               <a:rPr lang="en-US" smtClean="0"/>
               <a:pPr/>
-              <a:t>5/27/2023</a:t>
+              <a:t>6/8/2023</a:t>
             </a:fld>
             <a:endParaRPr lang="en-US" dirty="0"/>
           </a:p>
@@ -4067,7 +4067,7 @@
             <a:fld id="{B61BEF0D-F0BB-DE4B-95CE-6DB70DBA9567}" type="datetimeFigureOut">
               <a:rPr lang="en-US" smtClean="0"/>
               <a:pPr/>
-              <a:t>5/27/2023</a:t>
+              <a:t>6/8/2023</a:t>
             </a:fld>
             <a:endParaRPr lang="en-US" dirty="0"/>
           </a:p>
@@ -5248,19 +5248,22 @@
             <a:pPr marL="0" indent="0">
               <a:buNone/>
             </a:pPr>
-            <a:endParaRPr lang="en-US" sz="2000" dirty="0"/>
-          </a:p>
-          <a:p>
-            <a:pPr marL="0" indent="0">
-              <a:buNone/>
-            </a:pPr>
             <a:r>
               <a:rPr lang="en-US" sz="2000" b="1" dirty="0"/>
               <a:t>class</a:t>
             </a:r>
             <a:r>
               <a:rPr lang="en-US" sz="2000" dirty="0"/>
-              <a:t> Simple{  </a:t>
+              <a:t> Simple</a:t>
+            </a:r>
+          </a:p>
+          <a:p>
+            <a:pPr marL="0" indent="0">
+              <a:buNone/>
+            </a:pPr>
+            <a:r>
+              <a:rPr lang="en-US" sz="2000" dirty="0"/>
+              <a:t>{  </a:t>
             </a:r>
           </a:p>
           <a:p>
@@ -5293,15 +5296,16 @@
             </a:r>
             <a:r>
               <a:rPr lang="en-US" sz="2000" dirty="0"/>
-              <a:t> main(String </a:t>
-            </a:r>
-            <a:r>
-              <a:rPr lang="en-US" sz="2000" dirty="0" err="1"/>
-              <a:t>args</a:t>
-            </a:r>
+              <a:t> main(String args[])</a:t>
+            </a:r>
+          </a:p>
+          <a:p>
+            <a:pPr marL="0" indent="0">
+              <a:buNone/>
+            </a:pPr>
             <a:r>
               <a:rPr lang="en-US" sz="2000" dirty="0"/>
-              <a:t>[]){  </a:t>
+              <a:t>    {  </a:t>
             </a:r>
           </a:p>
           <a:p>
@@ -5310,7 +5314,7 @@
             </a:pPr>
             <a:r>
               <a:rPr lang="en-US" sz="2000" dirty="0"/>
-              <a:t>     </a:t>
+              <a:t>           </a:t>
             </a:r>
             <a:r>
               <a:rPr lang="en-US" sz="2000" dirty="0" err="1"/>
@@ -5338,11 +5342,6 @@
               <a:rPr lang="en-US" sz="2000" dirty="0"/>
               <a:t>}  </a:t>
             </a:r>
-          </a:p>
-          <a:p>
-            <a:pPr marL="0" indent="0">
-              <a:buNone/>
-            </a:pPr>
             <a:endParaRPr lang="en-US" sz="2000" b="1" dirty="0"/>
           </a:p>
           <a:p>
@@ -26242,13 +26241,29 @@
             <a:endParaRPr lang="en-US" sz="2400" dirty="0"/>
           </a:p>
           <a:p>
+            <a:r>
+              <a:rPr lang="en-US" sz="2400" dirty="0"/>
+              <a:t>Basic concepts of OOPs are:</a:t>
+            </a:r>
+          </a:p>
+          <a:p>
             <a:pPr marL="457200" indent="-457200">
               <a:buFont typeface="+mj-lt"/>
               <a:buAutoNum type="arabicPeriod"/>
             </a:pPr>
             <a:r>
               <a:rPr lang="en-US" sz="2400" dirty="0"/>
-              <a:t>Basic concepts of OOPs are:</a:t>
+              <a:t>Class</a:t>
+            </a:r>
+          </a:p>
+          <a:p>
+            <a:pPr marL="457200" indent="-457200">
+              <a:buFont typeface="+mj-lt"/>
+              <a:buAutoNum type="arabicPeriod"/>
+            </a:pPr>
+            <a:r>
+              <a:rPr lang="en-US" sz="2400" dirty="0"/>
+              <a:t>Object</a:t>
             </a:r>
           </a:p>
           <a:p>
@@ -26266,19 +26281,9 @@
                   </a:extLst>
                 </a:hlinkClick>
               </a:rPr>
-              <a:t>Object</a:t>
+              <a:t>Inheritance</a:t>
             </a:r>
             <a:endParaRPr lang="en-US" sz="2400" dirty="0"/>
-          </a:p>
-          <a:p>
-            <a:pPr marL="457200" indent="-457200">
-              <a:buFont typeface="+mj-lt"/>
-              <a:buAutoNum type="arabicPeriod"/>
-            </a:pPr>
-            <a:r>
-              <a:rPr lang="en-US" sz="2400" dirty="0"/>
-              <a:t>Class</a:t>
-            </a:r>
           </a:p>
           <a:p>
             <a:pPr marL="457200" indent="-457200">
@@ -26295,7 +26300,7 @@
                   </a:extLst>
                 </a:hlinkClick>
               </a:rPr>
-              <a:t>Inheritance</a:t>
+              <a:t>Polymorphism</a:t>
             </a:r>
             <a:endParaRPr lang="en-US" sz="2400" dirty="0"/>
           </a:p>
@@ -26314,7 +26319,7 @@
                   </a:extLst>
                 </a:hlinkClick>
               </a:rPr>
-              <a:t>Polymorphism</a:t>
+              <a:t>Abstraction</a:t>
             </a:r>
             <a:endParaRPr lang="en-US" sz="2400" dirty="0"/>
           </a:p>
@@ -26326,25 +26331,6 @@
             <a:r>
               <a:rPr lang="en-US" sz="2400" dirty="0">
                 <a:hlinkClick r:id="rId6">
-                  <a:extLst>
-                    <a:ext uri="{A12FA001-AC4F-418D-AE19-62706E023703}">
-                      <ahyp:hlinkClr xmlns:ahyp="http://schemas.microsoft.com/office/drawing/2018/hyperlinkcolor" val="tx"/>
-                    </a:ext>
-                  </a:extLst>
-                </a:hlinkClick>
-              </a:rPr>
-              <a:t>Abstraction</a:t>
-            </a:r>
-            <a:endParaRPr lang="en-US" sz="2400" dirty="0"/>
-          </a:p>
-          <a:p>
-            <a:pPr marL="457200" indent="-457200">
-              <a:buFont typeface="+mj-lt"/>
-              <a:buAutoNum type="arabicPeriod"/>
-            </a:pPr>
-            <a:r>
-              <a:rPr lang="en-US" sz="2400" dirty="0">
-                <a:hlinkClick r:id="rId7">
                   <a:extLst>
                     <a:ext uri="{A12FA001-AC4F-418D-AE19-62706E023703}">
                       <ahyp:hlinkClr xmlns:ahyp="http://schemas.microsoft.com/office/drawing/2018/hyperlinkcolor" val="tx"/>

</xml_diff>